<commit_message>
added slide for dimensions
</commit_message>
<xml_diff>
--- a/presentation.pptx
+++ b/presentation.pptx
@@ -25,6 +25,8 @@
     <p:sldId id="273" r:id="rId19"/>
     <p:sldId id="274" r:id="rId20"/>
     <p:sldId id="275" r:id="rId21"/>
+    <p:sldId id="276" r:id="rId22"/>
+    <p:sldId id="277" r:id="rId23"/>
   </p:sldIdLst>
   <p:sldSz cx="9144000" cy="5143500" type="screen16x9"/>
   <p:notesSz cx="6858000" cy="9144000"/>
@@ -3238,7 +3240,7 @@
             </a:pPr>
             <a:r>
               <a:rPr/>
-              <a:t>Predictors Transformed Model Diagnostics</a:t>
+              <a:t>Full (Untransformed) Model Diagnostics</a:t>
             </a:r>
           </a:p>
         </p:txBody>
@@ -3269,7 +3271,7 @@
 ##  Shapiro-Wilk normality test
 ## 
 ## data:  .
-## W = 0.92008, p-value = 1.737e-06</a:t>
+## W = 0.94368, p-value = 5.779e-05</a:t>
             </a:r>
           </a:p>
           <a:p>
@@ -3284,7 +3286,7 @@
 ##  studentized Breusch-Pagan test
 ## 
 ## data:  .
-## BP = 21.118, df = 7, p-value = 0.003599</a:t>
+## BP = 22.387, df = 7, p-value = 0.002178</a:t>
             </a:r>
           </a:p>
         </p:txBody>
@@ -3331,6 +3333,192 @@
             </a:pPr>
             <a:r>
               <a:rPr/>
+              <a:t>Reduced Multicolinarity Model Diagnostics</a:t>
+            </a:r>
+          </a:p>
+        </p:txBody>
+      </p:sp>
+      <p:sp>
+        <p:nvSpPr>
+          <p:cNvPr id="3" name="Content Placeholder 2"/>
+          <p:cNvSpPr>
+            <a:spLocks noGrp="1"/>
+          </p:cNvSpPr>
+          <p:nvPr>
+            <p:ph idx="1"/>
+          </p:nvPr>
+        </p:nvSpPr>
+        <p:spPr/>
+        <p:txBody>
+          <a:bodyPr/>
+          <a:lstStyle/>
+          <a:p>
+            <a:pPr lvl="0" indent="0">
+              <a:buNone/>
+            </a:pPr>
+            <a:r>
+              <a:rPr>
+                <a:latin typeface="Courier"/>
+              </a:rPr>
+              <a:t>## 
+##  Shapiro-Wilk normality test
+## 
+## data:  .
+## W = 0.94148, p-value = 4.056e-05</a:t>
+            </a:r>
+          </a:p>
+          <a:p>
+            <a:pPr lvl="0" indent="0">
+              <a:buNone/>
+            </a:pPr>
+            <a:r>
+              <a:rPr>
+                <a:latin typeface="Courier"/>
+              </a:rPr>
+              <a:t>## 
+##  studentized Breusch-Pagan test
+## 
+## data:  .
+## BP = 21.846, df = 5, p-value = 0.00056</a:t>
+            </a:r>
+          </a:p>
+        </p:txBody>
+      </p:sp>
+    </p:spTree>
+  </p:cSld>
+</p:sld>
+</file>
+
+<file path=ppt/slides/slide12.xml><?xml version="1.0" encoding="utf-8"?>
+<p:sld xmlns:a="http://schemas.openxmlformats.org/drawingml/2006/main" xmlns:r="http://schemas.openxmlformats.org/officeDocument/2006/relationships" xmlns:p="http://schemas.openxmlformats.org/presentationml/2006/main">
+  <p:cSld>
+    <p:spTree>
+      <p:nvGrpSpPr>
+        <p:cNvPr id="1" name=""/>
+        <p:cNvGrpSpPr/>
+        <p:nvPr/>
+      </p:nvGrpSpPr>
+      <p:grpSpPr>
+        <a:xfrm>
+          <a:off x="0" y="0"/>
+          <a:ext cx="0" cy="0"/>
+          <a:chOff x="0" y="0"/>
+          <a:chExt cx="0" cy="0"/>
+        </a:xfrm>
+      </p:grpSpPr>
+      <p:sp>
+        <p:nvSpPr>
+          <p:cNvPr id="2" name="Title 1"/>
+          <p:cNvSpPr>
+            <a:spLocks noGrp="1"/>
+          </p:cNvSpPr>
+          <p:nvPr>
+            <p:ph type="title"/>
+          </p:nvPr>
+        </p:nvSpPr>
+        <p:spPr/>
+        <p:txBody>
+          <a:bodyPr/>
+          <a:lstStyle/>
+          <a:p>
+            <a:pPr lvl="0" indent="0" marL="0">
+              <a:buNone/>
+            </a:pPr>
+            <a:r>
+              <a:rPr/>
+              <a:t>Predictors Transformed Model Diagnostics</a:t>
+            </a:r>
+          </a:p>
+        </p:txBody>
+      </p:sp>
+      <p:sp>
+        <p:nvSpPr>
+          <p:cNvPr id="3" name="Content Placeholder 2"/>
+          <p:cNvSpPr>
+            <a:spLocks noGrp="1"/>
+          </p:cNvSpPr>
+          <p:nvPr>
+            <p:ph idx="1"/>
+          </p:nvPr>
+        </p:nvSpPr>
+        <p:spPr/>
+        <p:txBody>
+          <a:bodyPr/>
+          <a:lstStyle/>
+          <a:p>
+            <a:pPr lvl="0" indent="0">
+              <a:buNone/>
+            </a:pPr>
+            <a:r>
+              <a:rPr>
+                <a:latin typeface="Courier"/>
+              </a:rPr>
+              <a:t>## 
+##  Shapiro-Wilk normality test
+## 
+## data:  .
+## W = 0.92008, p-value = 1.737e-06</a:t>
+            </a:r>
+          </a:p>
+          <a:p>
+            <a:pPr lvl="0" indent="0">
+              <a:buNone/>
+            </a:pPr>
+            <a:r>
+              <a:rPr>
+                <a:latin typeface="Courier"/>
+              </a:rPr>
+              <a:t>## 
+##  studentized Breusch-Pagan test
+## 
+## data:  .
+## BP = 21.118, df = 7, p-value = 0.003599</a:t>
+            </a:r>
+          </a:p>
+        </p:txBody>
+      </p:sp>
+    </p:spTree>
+  </p:cSld>
+</p:sld>
+</file>
+
+<file path=ppt/slides/slide13.xml><?xml version="1.0" encoding="utf-8"?>
+<p:sld xmlns:a="http://schemas.openxmlformats.org/drawingml/2006/main" xmlns:r="http://schemas.openxmlformats.org/officeDocument/2006/relationships" xmlns:p="http://schemas.openxmlformats.org/presentationml/2006/main">
+  <p:cSld>
+    <p:spTree>
+      <p:nvGrpSpPr>
+        <p:cNvPr id="1" name=""/>
+        <p:cNvGrpSpPr/>
+        <p:nvPr/>
+      </p:nvGrpSpPr>
+      <p:grpSpPr>
+        <a:xfrm>
+          <a:off x="0" y="0"/>
+          <a:ext cx="0" cy="0"/>
+          <a:chOff x="0" y="0"/>
+          <a:chExt cx="0" cy="0"/>
+        </a:xfrm>
+      </p:grpSpPr>
+      <p:sp>
+        <p:nvSpPr>
+          <p:cNvPr id="2" name="Title 1"/>
+          <p:cNvSpPr>
+            <a:spLocks noGrp="1"/>
+          </p:cNvSpPr>
+          <p:nvPr>
+            <p:ph type="title"/>
+          </p:nvPr>
+        </p:nvSpPr>
+        <p:spPr/>
+        <p:txBody>
+          <a:bodyPr/>
+          <a:lstStyle/>
+          <a:p>
+            <a:pPr lvl="0" indent="0" marL="0">
+              <a:buNone/>
+            </a:pPr>
+            <a:r>
+              <a:rPr/>
               <a:t>Full (Transformed) Model Diagnostics</a:t>
             </a:r>
           </a:p>
@@ -3387,7 +3575,7 @@
 </p:sld>
 </file>
 
-<file path=ppt/slides/slide12.xml><?xml version="1.0" encoding="utf-8"?>
+<file path=ppt/slides/slide14.xml><?xml version="1.0" encoding="utf-8"?>
 <p:sld xmlns:a="http://schemas.openxmlformats.org/drawingml/2006/main" xmlns:r="http://schemas.openxmlformats.org/officeDocument/2006/relationships" xmlns:p="http://schemas.openxmlformats.org/presentationml/2006/main">
   <p:cSld>
     <p:spTree>
@@ -3733,7 +3921,7 @@
 </p:sld>
 </file>
 
-<file path=ppt/slides/slide13.xml><?xml version="1.0" encoding="utf-8"?>
+<file path=ppt/slides/slide15.xml><?xml version="1.0" encoding="utf-8"?>
 <p:sld xmlns:a="http://schemas.openxmlformats.org/drawingml/2006/main" xmlns:r="http://schemas.openxmlformats.org/officeDocument/2006/relationships" xmlns:p="http://schemas.openxmlformats.org/presentationml/2006/main">
   <p:cSld>
     <p:spTree>
@@ -4349,7 +4537,7 @@
 </p:sld>
 </file>
 
-<file path=ppt/slides/slide14.xml><?xml version="1.0" encoding="utf-8"?>
+<file path=ppt/slides/slide16.xml><?xml version="1.0" encoding="utf-8"?>
 <p:sld xmlns:a="http://schemas.openxmlformats.org/drawingml/2006/main" xmlns:r="http://schemas.openxmlformats.org/officeDocument/2006/relationships" xmlns:p="http://schemas.openxmlformats.org/presentationml/2006/main">
   <p:cSld>
     <p:spTree>
@@ -4393,7 +4581,7 @@
       </p:sp>
       <p:pic>
         <p:nvPicPr>
-          <p:cNvPr descr="presentation_files/figure-pptx/unnamed-chunk-10-1.png" id="0" name="Picture 1"/>
+          <p:cNvPr descr="presentation_files/figure-pptx/unnamed-chunk-40-1.png" id="0" name="Picture 1"/>
           <p:cNvPicPr>
             <a:picLocks noGrp="1" noChangeAspect="1"/>
           </p:cNvPicPr>
@@ -4426,7 +4614,7 @@
 </p:sld>
 </file>
 
-<file path=ppt/slides/slide15.xml><?xml version="1.0" encoding="utf-8"?>
+<file path=ppt/slides/slide17.xml><?xml version="1.0" encoding="utf-8"?>
 <p:sld xmlns:a="http://schemas.openxmlformats.org/drawingml/2006/main" xmlns:r="http://schemas.openxmlformats.org/officeDocument/2006/relationships" xmlns:p="http://schemas.openxmlformats.org/presentationml/2006/main">
   <p:cSld>
     <p:spTree>
@@ -4470,7 +4658,7 @@
       </p:sp>
       <p:pic>
         <p:nvPicPr>
-          <p:cNvPr descr="presentation_files/figure-pptx/unnamed-chunk-11-1.png" id="0" name="Picture 1"/>
+          <p:cNvPr descr="presentation_files/figure-pptx/unnamed-chunk-41-1.png" id="0" name="Picture 1"/>
           <p:cNvPicPr>
             <a:picLocks noGrp="1" noChangeAspect="1"/>
           </p:cNvPicPr>
@@ -4503,7 +4691,7 @@
 </p:sld>
 </file>
 
-<file path=ppt/slides/slide16.xml><?xml version="1.0" encoding="utf-8"?>
+<file path=ppt/slides/slide18.xml><?xml version="1.0" encoding="utf-8"?>
 <p:sld xmlns:a="http://schemas.openxmlformats.org/drawingml/2006/main" xmlns:r="http://schemas.openxmlformats.org/officeDocument/2006/relationships" xmlns:p="http://schemas.openxmlformats.org/presentationml/2006/main">
   <p:cSld>
     <p:spTree>
@@ -4596,7 +4784,7 @@
 </p:sld>
 </file>
 
-<file path=ppt/slides/slide17.xml><?xml version="1.0" encoding="utf-8"?>
+<file path=ppt/slides/slide19.xml><?xml version="1.0" encoding="utf-8"?>
 <p:sld xmlns:a="http://schemas.openxmlformats.org/drawingml/2006/main" xmlns:r="http://schemas.openxmlformats.org/officeDocument/2006/relationships" xmlns:p="http://schemas.openxmlformats.org/presentationml/2006/main">
   <p:cSld>
     <p:spTree>
@@ -4934,7 +5122,7 @@
 </p:sld>
 </file>
 
-<file path=ppt/slides/slide18.xml><?xml version="1.0" encoding="utf-8"?>
+<file path=ppt/slides/slide2.xml><?xml version="1.0" encoding="utf-8"?>
 <p:sld xmlns:a="http://schemas.openxmlformats.org/drawingml/2006/main" xmlns:r="http://schemas.openxmlformats.org/officeDocument/2006/relationships" xmlns:p="http://schemas.openxmlformats.org/presentationml/2006/main">
   <p:cSld>
     <p:spTree>
@@ -4961,6 +5149,92 @@
             <p:ph type="title"/>
           </p:nvPr>
         </p:nvSpPr>
+        <p:spPr/>
+        <p:txBody>
+          <a:bodyPr/>
+          <a:lstStyle/>
+          <a:p>
+            <a:pPr lvl="0" indent="0" marL="0">
+              <a:buNone/>
+            </a:pPr>
+            <a:r>
+              <a:rPr/>
+              <a:t>Introduction</a:t>
+            </a:r>
+          </a:p>
+        </p:txBody>
+      </p:sp>
+      <p:sp>
+        <p:nvSpPr>
+          <p:cNvPr id="3" name="Content Placeholder 2"/>
+          <p:cNvSpPr>
+            <a:spLocks noGrp="1"/>
+          </p:cNvSpPr>
+          <p:nvPr>
+            <p:ph idx="1"/>
+          </p:nvPr>
+        </p:nvSpPr>
+        <p:spPr/>
+        <p:txBody>
+          <a:bodyPr/>
+          <a:lstStyle/>
+          <a:p>
+            <a:pPr lvl="0"/>
+            <a:r>
+              <a:rPr/>
+              <a:t>Description</a:t>
+            </a:r>
+          </a:p>
+          <a:p>
+            <a:pPr lvl="0"/>
+            <a:r>
+              <a:rPr/>
+              <a:t>Research Question:</a:t>
+            </a:r>
+          </a:p>
+          <a:p>
+            <a:pPr lvl="1" indent="0" marL="342900">
+              <a:buNone/>
+            </a:pPr>
+            <a:r>
+              <a:rPr b="1"/>
+              <a:t>Which characteristics of Electric Vehicles have a significant impact on their price?</a:t>
+            </a:r>
+          </a:p>
+        </p:txBody>
+      </p:sp>
+    </p:spTree>
+  </p:cSld>
+</p:sld>
+</file>
+
+<file path=ppt/slides/slide20.xml><?xml version="1.0" encoding="utf-8"?>
+<p:sld xmlns:a="http://schemas.openxmlformats.org/drawingml/2006/main" xmlns:r="http://schemas.openxmlformats.org/officeDocument/2006/relationships" xmlns:p="http://schemas.openxmlformats.org/presentationml/2006/main">
+  <p:cSld>
+    <p:spTree>
+      <p:nvGrpSpPr>
+        <p:cNvPr id="1" name=""/>
+        <p:cNvGrpSpPr/>
+        <p:nvPr/>
+      </p:nvGrpSpPr>
+      <p:grpSpPr>
+        <a:xfrm>
+          <a:off x="0" y="0"/>
+          <a:ext cx="0" cy="0"/>
+          <a:chOff x="0" y="0"/>
+          <a:chExt cx="0" cy="0"/>
+        </a:xfrm>
+      </p:grpSpPr>
+      <p:sp>
+        <p:nvSpPr>
+          <p:cNvPr id="2" name="Title 1"/>
+          <p:cNvSpPr>
+            <a:spLocks noGrp="1"/>
+          </p:cNvSpPr>
+          <p:nvPr>
+            <p:ph type="title"/>
+          </p:nvPr>
+        </p:nvSpPr>
         <p:spPr>
           <a:xfrm>
             <a:off x="457201" y="204787"/>
@@ -4983,7 +5257,7 @@
       </p:sp>
       <p:pic>
         <p:nvPicPr>
-          <p:cNvPr descr="presentation_files/figure-pptx/unnamed-chunk-14-1.png" id="0" name="Picture 1"/>
+          <p:cNvPr descr="presentation_files/figure-pptx/unnamed-chunk-44-1.png" id="0" name="Picture 1"/>
           <p:cNvPicPr>
             <a:picLocks noGrp="1" noChangeAspect="1"/>
           </p:cNvPicPr>
@@ -5016,7 +5290,7 @@
 </p:sld>
 </file>
 
-<file path=ppt/slides/slide19.xml><?xml version="1.0" encoding="utf-8"?>
+<file path=ppt/slides/slide21.xml><?xml version="1.0" encoding="utf-8"?>
 <p:sld xmlns:a="http://schemas.openxmlformats.org/drawingml/2006/main" xmlns:r="http://schemas.openxmlformats.org/officeDocument/2006/relationships" xmlns:p="http://schemas.openxmlformats.org/presentationml/2006/main">
   <p:cSld>
     <p:spTree>
@@ -5287,93 +5561,7 @@
 </p:sld>
 </file>
 
-<file path=ppt/slides/slide2.xml><?xml version="1.0" encoding="utf-8"?>
-<p:sld xmlns:a="http://schemas.openxmlformats.org/drawingml/2006/main" xmlns:r="http://schemas.openxmlformats.org/officeDocument/2006/relationships" xmlns:p="http://schemas.openxmlformats.org/presentationml/2006/main">
-  <p:cSld>
-    <p:spTree>
-      <p:nvGrpSpPr>
-        <p:cNvPr id="1" name=""/>
-        <p:cNvGrpSpPr/>
-        <p:nvPr/>
-      </p:nvGrpSpPr>
-      <p:grpSpPr>
-        <a:xfrm>
-          <a:off x="0" y="0"/>
-          <a:ext cx="0" cy="0"/>
-          <a:chOff x="0" y="0"/>
-          <a:chExt cx="0" cy="0"/>
-        </a:xfrm>
-      </p:grpSpPr>
-      <p:sp>
-        <p:nvSpPr>
-          <p:cNvPr id="2" name="Title 1"/>
-          <p:cNvSpPr>
-            <a:spLocks noGrp="1"/>
-          </p:cNvSpPr>
-          <p:nvPr>
-            <p:ph type="title"/>
-          </p:nvPr>
-        </p:nvSpPr>
-        <p:spPr/>
-        <p:txBody>
-          <a:bodyPr/>
-          <a:lstStyle/>
-          <a:p>
-            <a:pPr lvl="0" indent="0" marL="0">
-              <a:buNone/>
-            </a:pPr>
-            <a:r>
-              <a:rPr/>
-              <a:t>Introduction</a:t>
-            </a:r>
-          </a:p>
-        </p:txBody>
-      </p:sp>
-      <p:sp>
-        <p:nvSpPr>
-          <p:cNvPr id="3" name="Content Placeholder 2"/>
-          <p:cNvSpPr>
-            <a:spLocks noGrp="1"/>
-          </p:cNvSpPr>
-          <p:nvPr>
-            <p:ph idx="1"/>
-          </p:nvPr>
-        </p:nvSpPr>
-        <p:spPr/>
-        <p:txBody>
-          <a:bodyPr/>
-          <a:lstStyle/>
-          <a:p>
-            <a:pPr lvl="0"/>
-            <a:r>
-              <a:rPr/>
-              <a:t>Description</a:t>
-            </a:r>
-          </a:p>
-          <a:p>
-            <a:pPr lvl="0"/>
-            <a:r>
-              <a:rPr/>
-              <a:t>Research Question:</a:t>
-            </a:r>
-          </a:p>
-          <a:p>
-            <a:pPr lvl="1" indent="0" marL="342900">
-              <a:buNone/>
-            </a:pPr>
-            <a:r>
-              <a:rPr b="1"/>
-              <a:t>Which characteristics of Electric Vehicles have a significant impact on their price?</a:t>
-            </a:r>
-          </a:p>
-        </p:txBody>
-      </p:sp>
-    </p:spTree>
-  </p:cSld>
-</p:sld>
-</file>
-
-<file path=ppt/slides/slide20.xml><?xml version="1.0" encoding="utf-8"?>
+<file path=ppt/slides/slide22.xml><?xml version="1.0" encoding="utf-8"?>
 <p:sld xmlns:a="http://schemas.openxmlformats.org/drawingml/2006/main" xmlns:r="http://schemas.openxmlformats.org/officeDocument/2006/relationships" xmlns:p="http://schemas.openxmlformats.org/presentationml/2006/main">
   <p:cSld>
     <p:spTree>
@@ -5457,11 +5645,184 @@
             </a:pPr>
             <a:r>
               <a:rPr/>
-              <a:t>Data Description</a:t>
-            </a:r>
-          </a:p>
-        </p:txBody>
-      </p:sp>
+              <a:t>Dimensions</a:t>
+            </a:r>
+          </a:p>
+        </p:txBody>
+      </p:sp>
+      <p:graphicFrame>
+        <p:nvGraphicFramePr>
+          <p:cNvPr id="6" name="Content Placeholder 5"/>
+          <p:cNvGraphicFramePr>
+            <a:graphicFrameLocks noGrp="1"/>
+          </p:cNvGraphicFramePr>
+          <p:nvPr>
+            <p:ph idx="1"/>
+          </p:nvPr>
+        </p:nvGraphicFramePr>
+        <p:xfrm>
+          <a:off x="457200" y="1193800"/>
+          <a:ext cx="8229600" cy="3390900"/>
+        </p:xfrm>
+        <a:graphic>
+          <a:graphicData uri="http://schemas.openxmlformats.org/drawingml/2006/table">
+            <a:tbl>
+              <a:tblPr firstRow="1" bandRow="1">
+                <a:tableStyleId>{5C22544A-7EE6-4342-B048-85BDC9FD1C3A}</a:tableStyleId>
+              </a:tblPr>
+              <a:tblGrid>
+                <a:gridCol w="2743200"/>
+                <a:gridCol w="2743200"/>
+                <a:gridCol w="2743200"/>
+              </a:tblGrid>
+              <a:tr h="0">
+                <a:tc>
+                  <a:txBody>
+                    <a:bodyPr/>
+                    <a:lstStyle/>
+                    <a:p>
+                      <a:pPr lvl="0" indent="0" marL="0" algn="l">
+                        <a:buNone/>
+                      </a:pPr>
+                      <a:r>
+                        <a:rPr/>
+                        <a:t>Dataset</a:t>
+                      </a:r>
+                    </a:p>
+                  </a:txBody>
+                  <a:tcPr/>
+                </a:tc>
+                <a:tc>
+                  <a:txBody>
+                    <a:bodyPr/>
+                    <a:lstStyle/>
+                    <a:p>
+                      <a:pPr lvl="0" indent="0" marL="0" algn="r">
+                        <a:buNone/>
+                      </a:pPr>
+                      <a:r>
+                        <a:rPr/>
+                        <a:t>Rows</a:t>
+                      </a:r>
+                    </a:p>
+                  </a:txBody>
+                  <a:tcPr/>
+                </a:tc>
+                <a:tc>
+                  <a:txBody>
+                    <a:bodyPr/>
+                    <a:lstStyle/>
+                    <a:p>
+                      <a:pPr lvl="0" indent="0" marL="0" algn="r">
+                        <a:buNone/>
+                      </a:pPr>
+                      <a:r>
+                        <a:rPr/>
+                        <a:t>Columns</a:t>
+                      </a:r>
+                    </a:p>
+                  </a:txBody>
+                  <a:tcPr/>
+                </a:tc>
+              </a:tr>
+              <a:tr h="0">
+                <a:tc>
+                  <a:txBody>
+                    <a:bodyPr/>
+                    <a:lstStyle/>
+                    <a:p>
+                      <a:pPr lvl="0" indent="0" marL="0" algn="l">
+                        <a:buNone/>
+                      </a:pPr>
+                      <a:r>
+                        <a:rPr/>
+                        <a:t>Full</a:t>
+                      </a:r>
+                    </a:p>
+                  </a:txBody>
+                </a:tc>
+                <a:tc>
+                  <a:txBody>
+                    <a:bodyPr/>
+                    <a:lstStyle/>
+                    <a:p>
+                      <a:pPr lvl="0" indent="0" marL="0" algn="r">
+                        <a:buNone/>
+                      </a:pPr>
+                      <a:r>
+                        <a:rPr/>
+                        <a:t>180</a:t>
+                      </a:r>
+                    </a:p>
+                  </a:txBody>
+                </a:tc>
+                <a:tc>
+                  <a:txBody>
+                    <a:bodyPr/>
+                    <a:lstStyle/>
+                    <a:p>
+                      <a:pPr lvl="0" indent="0" marL="0" algn="r">
+                        <a:buNone/>
+                      </a:pPr>
+                      <a:r>
+                        <a:rPr/>
+                        <a:t>124</a:t>
+                      </a:r>
+                    </a:p>
+                  </a:txBody>
+                </a:tc>
+              </a:tr>
+              <a:tr h="0">
+                <a:tc>
+                  <a:txBody>
+                    <a:bodyPr/>
+                    <a:lstStyle/>
+                    <a:p>
+                      <a:pPr lvl="0" indent="0" marL="0" algn="l">
+                        <a:buNone/>
+                      </a:pPr>
+                      <a:r>
+                        <a:rPr/>
+                        <a:t>Complete</a:t>
+                      </a:r>
+                    </a:p>
+                  </a:txBody>
+                </a:tc>
+                <a:tc>
+                  <a:txBody>
+                    <a:bodyPr/>
+                    <a:lstStyle/>
+                    <a:p>
+                      <a:pPr lvl="0" indent="0" marL="0" algn="r">
+                        <a:buNone/>
+                      </a:pPr>
+                      <a:r>
+                        <a:rPr/>
+                        <a:t>11</a:t>
+                      </a:r>
+                    </a:p>
+                  </a:txBody>
+                </a:tc>
+                <a:tc>
+                  <a:txBody>
+                    <a:bodyPr/>
+                    <a:lstStyle/>
+                    <a:p>
+                      <a:pPr lvl="0" indent="0" marL="0" algn="r">
+                        <a:buNone/>
+                      </a:pPr>
+                      <a:r>
+                        <a:rPr/>
+                        <a:t>11</a:t>
+                      </a:r>
+                    </a:p>
+                  </a:txBody>
+                </a:tc>
+              </a:tr>
+            </a:tbl>
+          </a:graphicData>
+        </a:graphic>
+      </p:graphicFrame>
     </p:spTree>
   </p:cSld>
 </p:sld>
@@ -5504,41 +5865,11 @@
             </a:pPr>
             <a:r>
               <a:rPr/>
-              <a:t>Word Cloud</a:t>
-            </a:r>
-          </a:p>
-        </p:txBody>
-      </p:sp>
-      <p:pic>
-        <p:nvPicPr>
-          <p:cNvPr descr="presentation_files/figure-pptx/unnamed-chunk-2-1.png" id="0" name="Picture 1"/>
-          <p:cNvPicPr>
-            <a:picLocks noGrp="1" noChangeAspect="1"/>
-          </p:cNvPicPr>
-          <p:nvPr/>
-        </p:nvPicPr>
-        <p:blipFill>
-          <a:blip r:embed="rId2"/>
-          <a:stretch>
-            <a:fillRect/>
-          </a:stretch>
-        </p:blipFill>
-        <p:spPr bwMode="auto">
-          <a:xfrm>
-            <a:off x="2451100" y="1193800"/>
-            <a:ext cx="4241800" cy="3390900"/>
-          </a:xfrm>
-          <a:prstGeom prst="rect">
-            <a:avLst/>
-          </a:prstGeom>
-          <a:noFill/>
-          <a:ln w="9525">
-            <a:noFill/>
-            <a:headEnd/>
-            <a:tailEnd/>
-          </a:ln>
-        </p:spPr>
-      </p:pic>
+              <a:t>Data Description</a:t>
+            </a:r>
+          </a:p>
+        </p:txBody>
+      </p:sp>
     </p:spTree>
   </p:cSld>
 </p:sld>
@@ -5581,14 +5912,14 @@
             </a:pPr>
             <a:r>
               <a:rPr/>
-              <a:t>Cars by Top Speed in km/h</a:t>
+              <a:t>Word Cloud</a:t>
             </a:r>
           </a:p>
         </p:txBody>
       </p:sp>
       <p:pic>
         <p:nvPicPr>
-          <p:cNvPr descr="presentation_files/figure-pptx/unnamed-chunk-3-1.png" id="0" name="Picture 1"/>
+          <p:cNvPr descr="presentation_files/figure-pptx/unnamed-chunk-31-1.png" id="0" name="Picture 1"/>
           <p:cNvPicPr>
             <a:picLocks noGrp="1" noChangeAspect="1"/>
           </p:cNvPicPr>
@@ -5658,14 +5989,14 @@
             </a:pPr>
             <a:r>
               <a:rPr/>
-              <a:t>Correlation Matrix</a:t>
+              <a:t>Cars by Top Speed in km/h</a:t>
             </a:r>
           </a:p>
         </p:txBody>
       </p:sp>
       <p:pic>
         <p:nvPicPr>
-          <p:cNvPr descr="presentation_files/figure-pptx/unnamed-chunk-4-1.png" id="0" name="Picture 1"/>
+          <p:cNvPr descr="presentation_files/figure-pptx/unnamed-chunk-32-1.png" id="0" name="Picture 1"/>
           <p:cNvPicPr>
             <a:picLocks noGrp="1" noChangeAspect="1"/>
           </p:cNvPicPr>
@@ -5735,81 +6066,41 @@
             </a:pPr>
             <a:r>
               <a:rPr/>
-              <a:t>Process</a:t>
-            </a:r>
-          </a:p>
-        </p:txBody>
-      </p:sp>
-      <p:sp>
-        <p:nvSpPr>
-          <p:cNvPr id="3" name="Content Placeholder 2"/>
-          <p:cNvSpPr>
-            <a:spLocks noGrp="1"/>
-          </p:cNvSpPr>
-          <p:nvPr>
-            <p:ph idx="1"/>
-          </p:nvPr>
-        </p:nvSpPr>
-        <p:spPr/>
-        <p:txBody>
-          <a:bodyPr/>
-          <a:lstStyle/>
-          <a:p>
-            <a:pPr lvl="0" indent="-342900" marL="342900">
-              <a:buAutoNum type="arabicParenBoth"/>
-            </a:pPr>
-            <a:r>
-              <a:rPr/>
-              <a:t>Clean data.</a:t>
-            </a:r>
-          </a:p>
-          <a:p>
-            <a:pPr lvl="0" indent="-342900" marL="342900">
-              <a:buAutoNum type="arabicParenBoth"/>
-            </a:pPr>
-            <a:r>
-              <a:rPr/>
-              <a:t>Make full model</a:t>
-            </a:r>
-          </a:p>
-          <a:p>
-            <a:pPr lvl="0" indent="-342900" marL="342900">
-              <a:buAutoNum type="arabicParenBoth"/>
-            </a:pPr>
-            <a:r>
-              <a:rPr/>
-              <a:t>Reduce multicolinearity</a:t>
-            </a:r>
-          </a:p>
-          <a:p>
-            <a:pPr lvl="0" indent="-342900" marL="342900">
-              <a:buAutoNum type="arabicParenBoth"/>
-            </a:pPr>
-            <a:r>
-              <a:rPr/>
-              <a:t>Transform predictors</a:t>
-            </a:r>
-          </a:p>
-          <a:p>
-            <a:pPr lvl="0" indent="-342900" marL="342900">
-              <a:buAutoNum type="arabicParenBoth"/>
-            </a:pPr>
-            <a:r>
-              <a:rPr/>
-              <a:t>Transform response</a:t>
-            </a:r>
-          </a:p>
-          <a:p>
-            <a:pPr lvl="0" indent="-342900" marL="342900">
-              <a:buAutoNum type="arabicParenBoth"/>
-            </a:pPr>
-            <a:r>
-              <a:rPr/>
-              <a:t>Stepwise-selection with BIC</a:t>
-            </a:r>
-          </a:p>
-        </p:txBody>
-      </p:sp>
+              <a:t>Correlation Matrix</a:t>
+            </a:r>
+          </a:p>
+        </p:txBody>
+      </p:sp>
+      <p:pic>
+        <p:nvPicPr>
+          <p:cNvPr descr="presentation_files/figure-pptx/unnamed-chunk-33-1.png" id="0" name="Picture 1"/>
+          <p:cNvPicPr>
+            <a:picLocks noGrp="1" noChangeAspect="1"/>
+          </p:cNvPicPr>
+          <p:nvPr/>
+        </p:nvPicPr>
+        <p:blipFill>
+          <a:blip r:embed="rId2"/>
+          <a:stretch>
+            <a:fillRect/>
+          </a:stretch>
+        </p:blipFill>
+        <p:spPr bwMode="auto">
+          <a:xfrm>
+            <a:off x="2451100" y="1193800"/>
+            <a:ext cx="4241800" cy="3390900"/>
+          </a:xfrm>
+          <a:prstGeom prst="rect">
+            <a:avLst/>
+          </a:prstGeom>
+          <a:noFill/>
+          <a:ln w="9525">
+            <a:noFill/>
+            <a:headEnd/>
+            <a:tailEnd/>
+          </a:ln>
+        </p:spPr>
+      </p:pic>
     </p:spTree>
   </p:cSld>
 </p:sld>
@@ -5852,57 +6143,41 @@
             </a:pPr>
             <a:r>
               <a:rPr/>
-              <a:t>Full (Untransformed) Model Diagnostics</a:t>
-            </a:r>
-          </a:p>
-        </p:txBody>
-      </p:sp>
-      <p:sp>
-        <p:nvSpPr>
-          <p:cNvPr id="3" name="Content Placeholder 2"/>
-          <p:cNvSpPr>
-            <a:spLocks noGrp="1"/>
-          </p:cNvSpPr>
-          <p:nvPr>
-            <p:ph idx="1"/>
-          </p:nvPr>
-        </p:nvSpPr>
-        <p:spPr/>
-        <p:txBody>
-          <a:bodyPr/>
-          <a:lstStyle/>
-          <a:p>
-            <a:pPr lvl="0" indent="0">
-              <a:buNone/>
-            </a:pPr>
-            <a:r>
-              <a:rPr>
-                <a:latin typeface="Courier"/>
-              </a:rPr>
-              <a:t>## 
-##  Shapiro-Wilk normality test
-## 
-## data:  .
-## W = 0.94368, p-value = 5.779e-05</a:t>
-            </a:r>
-          </a:p>
-          <a:p>
-            <a:pPr lvl="0" indent="0">
-              <a:buNone/>
-            </a:pPr>
-            <a:r>
-              <a:rPr>
-                <a:latin typeface="Courier"/>
-              </a:rPr>
-              <a:t>## 
-##  studentized Breusch-Pagan test
-## 
-## data:  .
-## BP = 22.387, df = 7, p-value = 0.002178</a:t>
-            </a:r>
-          </a:p>
-        </p:txBody>
-      </p:sp>
+              <a:t>Scatterplot Matrix</a:t>
+            </a:r>
+          </a:p>
+        </p:txBody>
+      </p:sp>
+      <p:pic>
+        <p:nvPicPr>
+          <p:cNvPr descr="presentation_files/figure-pptx/unnamed-chunk-34-1.png" id="0" name="Picture 1"/>
+          <p:cNvPicPr>
+            <a:picLocks noGrp="1" noChangeAspect="1"/>
+          </p:cNvPicPr>
+          <p:nvPr/>
+        </p:nvPicPr>
+        <p:blipFill>
+          <a:blip r:embed="rId2"/>
+          <a:stretch>
+            <a:fillRect/>
+          </a:stretch>
+        </p:blipFill>
+        <p:spPr bwMode="auto">
+          <a:xfrm>
+            <a:off x="2451100" y="1193800"/>
+            <a:ext cx="4241800" cy="3390900"/>
+          </a:xfrm>
+          <a:prstGeom prst="rect">
+            <a:avLst/>
+          </a:prstGeom>
+          <a:noFill/>
+          <a:ln w="9525">
+            <a:noFill/>
+            <a:headEnd/>
+            <a:tailEnd/>
+          </a:ln>
+        </p:spPr>
+      </p:pic>
     </p:spTree>
   </p:cSld>
 </p:sld>
@@ -5945,7 +6220,7 @@
             </a:pPr>
             <a:r>
               <a:rPr/>
-              <a:t>Reduced Multicolinarity Model Diagnostics</a:t>
+              <a:t>Process</a:t>
             </a:r>
           </a:p>
         </p:txBody>
@@ -5965,33 +6240,57 @@
           <a:bodyPr/>
           <a:lstStyle/>
           <a:p>
-            <a:pPr lvl="0" indent="0">
-              <a:buNone/>
+            <a:pPr lvl="0" indent="-342900" marL="342900">
+              <a:buAutoNum type="arabicParenBoth"/>
             </a:pPr>
             <a:r>
-              <a:rPr>
-                <a:latin typeface="Courier"/>
-              </a:rPr>
-              <a:t>## 
-##  Shapiro-Wilk normality test
-## 
-## data:  .
-## W = 0.94148, p-value = 4.056e-05</a:t>
-            </a:r>
-          </a:p>
-          <a:p>
-            <a:pPr lvl="0" indent="0">
-              <a:buNone/>
+              <a:rPr/>
+              <a:t>Clean data.</a:t>
+            </a:r>
+          </a:p>
+          <a:p>
+            <a:pPr lvl="0" indent="-342900" marL="342900">
+              <a:buAutoNum type="arabicParenBoth"/>
             </a:pPr>
             <a:r>
-              <a:rPr>
-                <a:latin typeface="Courier"/>
-              </a:rPr>
-              <a:t>## 
-##  studentized Breusch-Pagan test
-## 
-## data:  .
-## BP = 21.846, df = 5, p-value = 0.00056</a:t>
+              <a:rPr/>
+              <a:t>Make full model</a:t>
+            </a:r>
+          </a:p>
+          <a:p>
+            <a:pPr lvl="0" indent="-342900" marL="342900">
+              <a:buAutoNum type="arabicParenBoth"/>
+            </a:pPr>
+            <a:r>
+              <a:rPr/>
+              <a:t>Reduce multicolinearity</a:t>
+            </a:r>
+          </a:p>
+          <a:p>
+            <a:pPr lvl="0" indent="-342900" marL="342900">
+              <a:buAutoNum type="arabicParenBoth"/>
+            </a:pPr>
+            <a:r>
+              <a:rPr/>
+              <a:t>Transform predictors</a:t>
+            </a:r>
+          </a:p>
+          <a:p>
+            <a:pPr lvl="0" indent="-342900" marL="342900">
+              <a:buAutoNum type="arabicParenBoth"/>
+            </a:pPr>
+            <a:r>
+              <a:rPr/>
+              <a:t>Transform response</a:t>
+            </a:r>
+          </a:p>
+          <a:p>
+            <a:pPr lvl="0" indent="-342900" marL="342900">
+              <a:buAutoNum type="arabicParenBoth"/>
+            </a:pPr>
+            <a:r>
+              <a:rPr/>
+              <a:t>Stepwise-selection with BIC</a:t>
             </a:r>
           </a:p>
         </p:txBody>

</xml_diff>